<commit_message>
random stuff in poster
</commit_message>
<xml_diff>
--- a/poster/CS224D_Poster.pptx
+++ b/poster/CS224D_Poster.pptx
@@ -6112,11 +6112,7 @@
           <a:p>
             <a:r>
               <a:rPr lang="en-US" sz="4800" b="1" dirty="0" smtClean="0"/>
-              <a:t>Unsupervised </a:t>
-            </a:r>
-            <a:r>
-              <a:rPr lang="en-US" sz="4800" b="1" dirty="0" smtClean="0"/>
-              <a:t>Aspect Discovery</a:t>
+              <a:t>Unsupervised Aspect Discovery</a:t>
             </a:r>
           </a:p>
           <a:p>
@@ -6126,17 +6122,8 @@
             </a:pPr>
             <a:r>
               <a:rPr lang="en-US" sz="3600" dirty="0" smtClean="0"/>
-              <a:t>How </a:t>
-            </a:r>
-            <a:r>
-              <a:rPr lang="en-US" sz="3600" dirty="0" smtClean="0"/>
-              <a:t>can we automatically generate lists of </a:t>
-            </a:r>
-            <a:r>
-              <a:rPr lang="en-US" sz="3600" dirty="0" smtClean="0"/>
-              <a:t>possible aspect words?</a:t>
-            </a:r>
-            <a:endParaRPr lang="en-US" sz="3600" dirty="0" smtClean="0"/>
+              <a:t>How can we automatically generate lists of possible aspect words?</a:t>
+            </a:r>
           </a:p>
           <a:p>
             <a:pPr marL="571500" indent="-571500">
@@ -6145,15 +6132,7 @@
             </a:pPr>
             <a:r>
               <a:rPr lang="en-US" sz="3600" dirty="0" smtClean="0"/>
-              <a:t>Train </a:t>
-            </a:r>
-            <a:r>
-              <a:rPr lang="en-US" sz="3600" dirty="0" smtClean="0"/>
-              <a:t>a word2vec representation of </a:t>
-            </a:r>
-            <a:r>
-              <a:rPr lang="en-US" sz="3600" dirty="0" smtClean="0"/>
-              <a:t>dataset (tokenized, </a:t>
+              <a:t>Train a word2vec representation of dataset (tokenized, </a:t>
             </a:r>
             <a:r>
               <a:rPr lang="en-US" sz="3600" dirty="0" err="1" smtClean="0"/>
@@ -6171,7 +6150,6 @@
               <a:rPr lang="en-US" sz="3600" dirty="0" smtClean="0"/>
               <a:t>.</a:t>
             </a:r>
-            <a:endParaRPr lang="en-US" sz="3600" dirty="0" smtClean="0"/>
           </a:p>
           <a:p>
             <a:pPr marL="571500" indent="-571500">
@@ -6180,15 +6158,7 @@
             </a:pPr>
             <a:r>
               <a:rPr lang="en-US" sz="3600" dirty="0" smtClean="0"/>
-              <a:t>Start with short “seed” list. Expand list by returning </a:t>
-            </a:r>
-            <a:r>
-              <a:rPr lang="en-US" sz="3600" dirty="0" smtClean="0"/>
-              <a:t>top 5 </a:t>
-            </a:r>
-            <a:r>
-              <a:rPr lang="en-US" sz="3600" dirty="0" smtClean="0"/>
-              <a:t>related word vectors, based on cosine similarity</a:t>
+              <a:t>Start with short “seed” list. Expand list by returning top 5 related word vectors, based on cosine similarity</a:t>
             </a:r>
           </a:p>
           <a:p>
@@ -6696,7 +6666,7 @@
         <p:spPr>
           <a:xfrm>
             <a:off x="15621000" y="6324600"/>
-            <a:ext cx="13243959" cy="4708982"/>
+            <a:ext cx="13243959" cy="4154984"/>
           </a:xfrm>
           <a:prstGeom prst="rect">
             <a:avLst/>
@@ -6763,151 +6733,17 @@
             </a:pPr>
             <a:r>
               <a:rPr lang="en-US" sz="3600" dirty="0" smtClean="0"/>
-              <a:t>&lt;&gt;</a:t>
-            </a:r>
-          </a:p>
-          <a:p>
-            <a:pPr marL="571500" lvl="1" indent="-571500">
-              <a:buFont typeface="Arial" panose="020B0604020202020204" pitchFamily="34" charset="0"/>
-              <a:buChar char="•"/>
-            </a:pPr>
+              <a:t>&lt;</a:t>
+            </a:r>
+            <a:r>
+              <a:rPr lang="en-US" sz="3600" dirty="0" smtClean="0"/>
+              <a:t>&gt;</a:t>
+            </a:r>
             <a:endParaRPr lang="en-US" sz="3600" dirty="0" smtClean="0"/>
           </a:p>
           <a:p>
-            <a:pPr marL="571500" lvl="1" indent="-571500">
-              <a:buFont typeface="Arial" panose="020B0604020202020204" pitchFamily="34" charset="0"/>
-              <a:buChar char="•"/>
-            </a:pPr>
-            <a:r>
-              <a:rPr lang="en-US" sz="3600" dirty="0" smtClean="0"/>
-              <a:t>Unigram </a:t>
-            </a:r>
-            <a:r>
-              <a:rPr lang="en-US" sz="3600" dirty="0"/>
-              <a:t>sentiment labels (using Bing Liu’s opinion lexicon</a:t>
-            </a:r>
-            <a:r>
-              <a:rPr lang="en-US" sz="3600" baseline="30000" dirty="0"/>
-              <a:t>3</a:t>
-            </a:r>
-            <a:r>
-              <a:rPr lang="en-US" sz="3600" dirty="0"/>
-              <a:t>)</a:t>
-            </a:r>
+            <a:pPr marL="0" lvl="1"/>
             <a:endParaRPr lang="en-US" sz="3600" dirty="0" smtClean="0"/>
-          </a:p>
-        </p:txBody>
-      </p:sp>
-      <p:sp>
-        <p:nvSpPr>
-          <p:cNvPr id="54" name="TextBox 53"/>
-          <p:cNvSpPr txBox="1"/>
-          <p:nvPr/>
-        </p:nvSpPr>
-        <p:spPr>
-          <a:xfrm>
-            <a:off x="15621000" y="17068800"/>
-            <a:ext cx="13243959" cy="3970318"/>
-          </a:xfrm>
-          <a:prstGeom prst="rect">
-            <a:avLst/>
-          </a:prstGeom>
-          <a:solidFill>
-            <a:schemeClr val="bg1">
-              <a:lumMod val="85000"/>
-            </a:schemeClr>
-          </a:solidFill>
-          <a:ln>
-            <a:solidFill>
-              <a:schemeClr val="tx1"/>
-            </a:solidFill>
-          </a:ln>
-        </p:spPr>
-        <p:txBody>
-          <a:bodyPr wrap="square" rtlCol="0">
-            <a:spAutoFit/>
-          </a:bodyPr>
-          <a:lstStyle/>
-          <a:p>
-            <a:pPr marL="571500" indent="-571500">
-              <a:buFont typeface="Arial" panose="020B0604020202020204" pitchFamily="34" charset="0"/>
-              <a:buChar char="•"/>
-            </a:pPr>
-            <a:r>
-              <a:rPr lang="en-US" sz="3600" dirty="0" smtClean="0"/>
-              <a:t>Aspect Discover</a:t>
-            </a:r>
-          </a:p>
-          <a:p>
-            <a:pPr marL="2766060" lvl="1" indent="-571500">
-              <a:buFont typeface="Arial" panose="020B0604020202020204" pitchFamily="34" charset="0"/>
-              <a:buChar char="•"/>
-            </a:pPr>
-            <a:r>
-              <a:rPr lang="en-US" sz="3600" dirty="0" smtClean="0"/>
-              <a:t>Three models were trained, the most successful of which used window sizes of 10 and 300 dimensional feature vectors. Frequency-based pruning was also performed.</a:t>
-            </a:r>
-            <a:endParaRPr lang="en-US" sz="3600" dirty="0"/>
-          </a:p>
-          <a:p>
-            <a:pPr marL="571500" indent="-571500">
-              <a:buFont typeface="Arial" panose="020B0604020202020204" pitchFamily="34" charset="0"/>
-              <a:buChar char="•"/>
-            </a:pPr>
-            <a:r>
-              <a:rPr lang="en-US" sz="3600" dirty="0"/>
-              <a:t>Aspect-Specific Sentiment </a:t>
-            </a:r>
-            <a:r>
-              <a:rPr lang="en-US" sz="3600" dirty="0" smtClean="0"/>
-              <a:t>Extraction</a:t>
-            </a:r>
-            <a:endParaRPr lang="en-US" sz="3600" dirty="0"/>
-          </a:p>
-          <a:p>
-            <a:pPr marL="2766060" lvl="1" indent="-571500">
-              <a:buFont typeface="Arial" panose="020B0604020202020204" pitchFamily="34" charset="0"/>
-              <a:buChar char="•"/>
-            </a:pPr>
-            <a:endParaRPr lang="en-US" sz="3600" dirty="0"/>
-          </a:p>
-        </p:txBody>
-      </p:sp>
-      <p:sp>
-        <p:nvSpPr>
-          <p:cNvPr id="55" name="TextBox 54"/>
-          <p:cNvSpPr txBox="1"/>
-          <p:nvPr/>
-        </p:nvSpPr>
-        <p:spPr>
-          <a:xfrm>
-            <a:off x="29641800" y="16611600"/>
-            <a:ext cx="13243959" cy="646331"/>
-          </a:xfrm>
-          <a:prstGeom prst="rect">
-            <a:avLst/>
-          </a:prstGeom>
-          <a:solidFill>
-            <a:schemeClr val="bg1">
-              <a:lumMod val="85000"/>
-            </a:schemeClr>
-          </a:solidFill>
-          <a:ln>
-            <a:solidFill>
-              <a:schemeClr val="tx1"/>
-            </a:solidFill>
-          </a:ln>
-        </p:spPr>
-        <p:txBody>
-          <a:bodyPr wrap="square" rtlCol="0">
-            <a:spAutoFit/>
-          </a:bodyPr>
-          <a:lstStyle/>
-          <a:p>
-            <a:r>
-              <a:rPr lang="en-US" sz="3600" dirty="0" smtClean="0"/>
-              <a:t>Maybe new table?</a:t>
-            </a:r>
           </a:p>
         </p:txBody>
       </p:sp>
@@ -7040,11 +6876,7 @@
             </a:r>
             <a:r>
               <a:rPr lang="en-US" sz="2600" dirty="0" smtClean="0"/>
-              <a:t> (right). Words shown are subset of top 10 closest words, and are sized roughly according to cosine </a:t>
-            </a:r>
-            <a:r>
-              <a:rPr lang="en-US" sz="2600" dirty="0" smtClean="0"/>
-              <a:t>similarity.</a:t>
+              <a:t> (right). Words shown are subset of top 10 closest words, and are sized roughly according to cosine similarity.</a:t>
             </a:r>
             <a:endParaRPr lang="en-US" sz="2600" dirty="0"/>
           </a:p>
@@ -7110,6 +6942,116 @@
           </a:prstGeom>
         </p:spPr>
       </p:pic>
+      <p:sp>
+        <p:nvSpPr>
+          <p:cNvPr id="30" name="TextBox 29"/>
+          <p:cNvSpPr txBox="1"/>
+          <p:nvPr/>
+        </p:nvSpPr>
+        <p:spPr>
+          <a:xfrm>
+            <a:off x="15621000" y="16611600"/>
+            <a:ext cx="13243959" cy="5262980"/>
+          </a:xfrm>
+          <a:prstGeom prst="rect">
+            <a:avLst/>
+          </a:prstGeom>
+          <a:solidFill>
+            <a:schemeClr val="bg1">
+              <a:lumMod val="85000"/>
+            </a:schemeClr>
+          </a:solidFill>
+          <a:ln>
+            <a:solidFill>
+              <a:schemeClr val="tx1"/>
+            </a:solidFill>
+          </a:ln>
+        </p:spPr>
+        <p:txBody>
+          <a:bodyPr wrap="square" rtlCol="0">
+            <a:spAutoFit/>
+          </a:bodyPr>
+          <a:lstStyle/>
+          <a:p>
+            <a:r>
+              <a:rPr lang="en-US" sz="4800" b="1" dirty="0"/>
+              <a:t>Aspect-Specific Sentiment Analysis</a:t>
+            </a:r>
+            <a:endParaRPr lang="en-US" sz="3600" i="1" dirty="0"/>
+          </a:p>
+          <a:p>
+            <a:pPr marL="571500" lvl="1" indent="-571500">
+              <a:buFont typeface="Arial" panose="020B0604020202020204" pitchFamily="34" charset="0"/>
+              <a:buChar char="•"/>
+            </a:pPr>
+            <a:r>
+              <a:rPr lang="en-US" sz="3600" dirty="0" smtClean="0"/>
+              <a:t>Dataset formed by finding windows </a:t>
+            </a:r>
+            <a:r>
+              <a:rPr lang="en-US" sz="3600" dirty="0" smtClean="0"/>
+              <a:t>containing aspects from expanded list and labels formed by aggregating unigram sentiment </a:t>
+            </a:r>
+            <a:r>
+              <a:rPr lang="en-US" sz="3600" dirty="0"/>
+              <a:t>labels (using Bing Liu’s opinion </a:t>
+            </a:r>
+            <a:r>
+              <a:rPr lang="en-US" sz="3600" dirty="0" smtClean="0"/>
+              <a:t>lexicon</a:t>
+            </a:r>
+            <a:r>
+              <a:rPr lang="en-US" sz="3600" baseline="30000" dirty="0" smtClean="0"/>
+              <a:t>3</a:t>
+            </a:r>
+            <a:r>
+              <a:rPr lang="en-US" sz="3600" dirty="0" smtClean="0"/>
+              <a:t>)</a:t>
+            </a:r>
+          </a:p>
+          <a:p>
+            <a:pPr marL="571500" lvl="1" indent="-571500">
+              <a:buFont typeface="Arial" panose="020B0604020202020204" pitchFamily="34" charset="0"/>
+              <a:buChar char="•"/>
+            </a:pPr>
+            <a:r>
+              <a:rPr lang="en-US" sz="3600" dirty="0" smtClean="0"/>
+              <a:t>To learn sentence-level, and by proxy aspect-level, sentiment we used a variation of the convolutional neural network created by Yoon Kim.</a:t>
+            </a:r>
+          </a:p>
+          <a:p>
+            <a:pPr marL="571500" lvl="1" indent="-571500">
+              <a:buFont typeface="Arial" panose="020B0604020202020204" pitchFamily="34" charset="0"/>
+              <a:buChar char="•"/>
+            </a:pPr>
+            <a:r>
+              <a:rPr lang="en-US" sz="3600" dirty="0" smtClean="0"/>
+              <a:t>CNN </a:t>
+            </a:r>
+            <a:r>
+              <a:rPr lang="en-US" sz="3600" dirty="0" err="1" smtClean="0"/>
+              <a:t>desciption</a:t>
+            </a:r>
+            <a:r>
+              <a:rPr lang="en-US" sz="3600" dirty="0" smtClean="0"/>
+              <a:t> (</a:t>
+            </a:r>
+            <a:r>
+              <a:rPr lang="en-US" sz="3600" dirty="0" err="1" smtClean="0"/>
+              <a:t>hyperparameters</a:t>
+            </a:r>
+            <a:r>
+              <a:rPr lang="en-US" sz="3600" dirty="0" smtClean="0"/>
+              <a:t> etc.), batch size =50, </a:t>
+            </a:r>
+            <a:r>
+              <a:rPr lang="en-US" sz="3600" smtClean="0"/>
+              <a:t>hidden layer = 100,</a:t>
+            </a:r>
+            <a:endParaRPr lang="en-US" sz="3600" dirty="0" smtClean="0"/>
+          </a:p>
+        </p:txBody>
+      </p:sp>
     </p:spTree>
     <p:extLst>
       <p:ext uri="{BB962C8B-B14F-4D97-AF65-F5344CB8AC3E}">

</xml_diff>